<commit_message>
Refined version of ppt
</commit_message>
<xml_diff>
--- a/Git_Projects/Smart_Parking_Finder_Poc/Smart_Parking_Presentation_Refined.pptx
+++ b/Git_Projects/Smart_Parking_Finder_Poc/Smart_Parking_Presentation_Refined.pptx
@@ -1959,7 +1959,7 @@
           <a:lstStyle/>
           <a:p>
             <a:pPr algn="ctr"/>
-            <a:endParaRPr lang="en-US"/>
+            <a:endParaRPr lang="en-US" dirty="0"/>
           </a:p>
         </p:txBody>
       </p:sp>
@@ -2177,6 +2177,11 @@
           <a:p>
             <a:r>
               <a:rPr lang="en-US" sz="2800" dirty="0">
+                <a:solidFill>
+                  <a:schemeClr val="accent5">
+                    <a:lumMod val="75000"/>
+                  </a:schemeClr>
+                </a:solidFill>
                 <a:latin typeface="Times New Roman"/>
                 <a:ea typeface="Calibri"/>
                 <a:cs typeface="Calibri"/>
@@ -2187,6 +2192,11 @@
           <a:p>
             <a:r>
               <a:rPr lang="en-US" sz="2800" dirty="0">
+                <a:solidFill>
+                  <a:schemeClr val="accent5">
+                    <a:lumMod val="75000"/>
+                  </a:schemeClr>
+                </a:solidFill>
                 <a:latin typeface="Times New Roman"/>
                 <a:ea typeface="Calibri"/>
                 <a:cs typeface="Calibri"/>
@@ -10715,7 +10725,7 @@
               </a:spcBef>
             </a:pPr>
             <a:r>
-              <a:rPr lang="en-US" sz="5400" b="1" kern="1200" spc="-300">
+              <a:rPr lang="en-US" sz="5400" b="1" kern="1200" spc="-300" dirty="0">
                 <a:solidFill>
                   <a:schemeClr val="accent2">
                     <a:lumMod val="75000"/>
@@ -10728,7 +10738,7 @@
               <a:t>Tech</a:t>
             </a:r>
             <a:r>
-              <a:rPr lang="en-US" sz="5400" b="1" kern="1200" spc="-300">
+              <a:rPr lang="en-US" sz="5400" b="1" kern="1200" spc="-300" dirty="0">
                 <a:solidFill>
                   <a:schemeClr val="tx1"/>
                 </a:solidFill>
@@ -10736,10 +10746,10 @@
                 <a:ea typeface="+mj-ea"/>
                 <a:cs typeface="+mj-cs"/>
               </a:rPr>
-              <a:t>  </a:t>
-            </a:r>
-            <a:r>
-              <a:rPr lang="en-US" sz="5400" b="1" kern="1200" spc="-300">
+              <a:t> </a:t>
+            </a:r>
+            <a:r>
+              <a:rPr lang="en-US" sz="5400" b="1" kern="1200" spc="-300" dirty="0">
                 <a:solidFill>
                   <a:schemeClr val="accent2">
                     <a:lumMod val="75000"/>
@@ -10751,7 +10761,7 @@
               </a:rPr>
               <a:t>Stack</a:t>
             </a:r>
-            <a:endParaRPr lang="en-US" sz="5400" kern="1200">
+            <a:endParaRPr lang="en-US" sz="5400" kern="1200" dirty="0">
               <a:solidFill>
                 <a:schemeClr val="accent2">
                   <a:lumMod val="75000"/>
@@ -17714,12 +17724,10 @@
               </a:spcAft>
               <a:buClrTx/>
               <a:buSzTx/>
-              <a:buFontTx/>
-              <a:buChar char="•"/>
               <a:tabLst/>
             </a:pPr>
             <a:r>
-              <a:rPr kumimoji="0" lang="en-US" altLang="en-US" sz="1800" b="0" i="0" u="none" strike="noStrike" cap="none" normalizeH="0" baseline="0">
+              <a:rPr kumimoji="0" lang="en-US" altLang="en-US" sz="1800" b="0" i="0" u="none" strike="noStrike" cap="none" normalizeH="0" baseline="0" dirty="0">
                 <a:ln>
                   <a:noFill/>
                 </a:ln>
@@ -17733,7 +17741,7 @@
               <a:t>⚡ Built backend APIs using </a:t>
             </a:r>
             <a:r>
-              <a:rPr kumimoji="0" lang="en-US" altLang="en-US" sz="1800" b="0" i="0" u="none" strike="noStrike" cap="none" normalizeH="0" baseline="0" err="1">
+              <a:rPr kumimoji="0" lang="en-US" altLang="en-US" sz="1800" b="0" i="0" u="none" strike="noStrike" cap="none" normalizeH="0" baseline="0" dirty="0" err="1">
                 <a:ln>
                   <a:noFill/>
                 </a:ln>
@@ -17747,7 +17755,7 @@
               <a:t>FastAPI</a:t>
             </a:r>
             <a:r>
-              <a:rPr kumimoji="0" lang="en-US" altLang="en-US" sz="1800" b="0" i="0" u="none" strike="noStrike" cap="none" normalizeH="0" baseline="0">
+              <a:rPr kumimoji="0" lang="en-US" altLang="en-US" sz="1800" b="0" i="0" u="none" strike="noStrike" cap="none" normalizeH="0" baseline="0" dirty="0">
                 <a:ln>
                   <a:noFill/>
                 </a:ln>
@@ -17776,7 +17784,7 @@
               <a:buSzTx/>
               <a:tabLst/>
             </a:pPr>
-            <a:endParaRPr kumimoji="0" lang="en-US" altLang="en-US" sz="1800" b="0" i="0" u="none" strike="noStrike" cap="none" normalizeH="0" baseline="0">
+            <a:endParaRPr kumimoji="0" lang="en-US" altLang="en-US" sz="1800" b="0" i="0" u="none" strike="noStrike" cap="none" normalizeH="0" baseline="0" dirty="0">
               <a:ln>
                 <a:noFill/>
               </a:ln>
@@ -17787,38 +17795,6 @@
               <a:latin typeface="Times New Roman" panose="02020603050405020304" pitchFamily="18" charset="0"/>
               <a:cs typeface="Times New Roman" panose="02020603050405020304" pitchFamily="18" charset="0"/>
             </a:endParaRPr>
-          </a:p>
-          <a:p>
-            <a:pPr marL="0" marR="0" lvl="0" indent="0" algn="l" defTabSz="914400" rtl="0" eaLnBrk="0" fontAlgn="base" latinLnBrk="0" hangingPunct="0">
-              <a:lnSpc>
-                <a:spcPct val="100000"/>
-              </a:lnSpc>
-              <a:spcBef>
-                <a:spcPct val="0"/>
-              </a:spcBef>
-              <a:spcAft>
-                <a:spcPct val="0"/>
-              </a:spcAft>
-              <a:buClrTx/>
-              <a:buSzTx/>
-              <a:buFontTx/>
-              <a:buChar char="•"/>
-              <a:tabLst/>
-            </a:pPr>
-            <a:r>
-              <a:rPr kumimoji="0" lang="en-US" altLang="en-US" sz="1800" b="0" i="0" u="none" strike="noStrike" cap="none" normalizeH="0" baseline="0">
-                <a:ln>
-                  <a:noFill/>
-                </a:ln>
-                <a:solidFill>
-                  <a:schemeClr val="tx1"/>
-                </a:solidFill>
-                <a:effectLst/>
-                <a:latin typeface="Times New Roman" panose="02020603050405020304" pitchFamily="18" charset="0"/>
-                <a:cs typeface="Times New Roman" panose="02020603050405020304" pitchFamily="18" charset="0"/>
-              </a:rPr>
-              <a:t>🔐 Added secure login and signup using JWT.</a:t>
-            </a:r>
           </a:p>
           <a:p>
             <a:pPr marL="0" marR="0" lvl="0" indent="0" algn="l" defTabSz="914400" rtl="0" eaLnBrk="0" fontAlgn="base" latinLnBrk="0" hangingPunct="0">
@@ -17835,37 +17811,8 @@
               <a:buSzTx/>
               <a:tabLst/>
             </a:pPr>
-            <a:endParaRPr kumimoji="0" lang="en-US" altLang="en-US" sz="1800" b="0" i="0" u="none" strike="noStrike" cap="none" normalizeH="0" baseline="0">
-              <a:ln>
-                <a:noFill/>
-              </a:ln>
-              <a:solidFill>
-                <a:schemeClr val="tx1"/>
-              </a:solidFill>
-              <a:effectLst/>
-              <a:latin typeface="Times New Roman" panose="02020603050405020304" pitchFamily="18" charset="0"/>
-              <a:cs typeface="Times New Roman" panose="02020603050405020304" pitchFamily="18" charset="0"/>
-            </a:endParaRPr>
-          </a:p>
-          <a:p>
-            <a:pPr marL="0" marR="0" lvl="0" indent="0" algn="l" defTabSz="914400" rtl="0" eaLnBrk="0" fontAlgn="base" latinLnBrk="0" hangingPunct="0">
-              <a:lnSpc>
-                <a:spcPct val="100000"/>
-              </a:lnSpc>
-              <a:spcBef>
-                <a:spcPct val="0"/>
-              </a:spcBef>
-              <a:spcAft>
-                <a:spcPct val="0"/>
-              </a:spcAft>
-              <a:buClrTx/>
-              <a:buSzTx/>
-              <a:buFontTx/>
-              <a:buChar char="•"/>
-              <a:tabLst/>
-            </a:pPr>
-            <a:r>
-              <a:rPr kumimoji="0" lang="en-US" altLang="en-US" sz="1800" b="0" i="0" u="none" strike="noStrike" cap="none" normalizeH="0" baseline="0">
+            <a:r>
+              <a:rPr kumimoji="0" lang="en-US" altLang="en-US" sz="1800" b="0" i="0" u="none" strike="noStrike" cap="none" normalizeH="0" baseline="0" dirty="0">
                 <a:ln>
                   <a:noFill/>
                 </a:ln>
@@ -17876,7 +17823,7 @@
                 <a:latin typeface="Times New Roman" panose="02020603050405020304" pitchFamily="18" charset="0"/>
                 <a:cs typeface="Times New Roman" panose="02020603050405020304" pitchFamily="18" charset="0"/>
               </a:rPr>
-              <a:t>🧪 Tested all APIs with Postman to make sure they work well.</a:t>
+              <a:t>🔐 Added secure login and signup using JWT.</a:t>
             </a:r>
           </a:p>
           <a:p>
@@ -17894,7 +17841,7 @@
               <a:buSzTx/>
               <a:tabLst/>
             </a:pPr>
-            <a:endParaRPr kumimoji="0" lang="en-US" altLang="en-US" sz="1800" b="0" i="0" u="none" strike="noStrike" cap="none" normalizeH="0" baseline="0">
+            <a:endParaRPr kumimoji="0" lang="en-US" altLang="en-US" sz="1800" b="0" i="0" u="none" strike="noStrike" cap="none" normalizeH="0" baseline="0" dirty="0">
               <a:ln>
                 <a:noFill/>
               </a:ln>
@@ -17905,38 +17852,6 @@
               <a:latin typeface="Times New Roman" panose="02020603050405020304" pitchFamily="18" charset="0"/>
               <a:cs typeface="Times New Roman" panose="02020603050405020304" pitchFamily="18" charset="0"/>
             </a:endParaRPr>
-          </a:p>
-          <a:p>
-            <a:pPr marL="0" marR="0" lvl="0" indent="0" algn="l" defTabSz="914400" rtl="0" eaLnBrk="0" fontAlgn="base" latinLnBrk="0" hangingPunct="0">
-              <a:lnSpc>
-                <a:spcPct val="100000"/>
-              </a:lnSpc>
-              <a:spcBef>
-                <a:spcPct val="0"/>
-              </a:spcBef>
-              <a:spcAft>
-                <a:spcPct val="0"/>
-              </a:spcAft>
-              <a:buClrTx/>
-              <a:buSzTx/>
-              <a:buFontTx/>
-              <a:buChar char="•"/>
-              <a:tabLst/>
-            </a:pPr>
-            <a:r>
-              <a:rPr kumimoji="0" lang="en-US" altLang="en-US" sz="1800" b="0" i="0" u="none" strike="noStrike" cap="none" normalizeH="0" baseline="0">
-                <a:ln>
-                  <a:noFill/>
-                </a:ln>
-                <a:solidFill>
-                  <a:schemeClr val="tx1"/>
-                </a:solidFill>
-                <a:effectLst/>
-                <a:latin typeface="Times New Roman" panose="02020603050405020304" pitchFamily="18" charset="0"/>
-                <a:cs typeface="Times New Roman" panose="02020603050405020304" pitchFamily="18" charset="0"/>
-              </a:rPr>
-              <a:t>👤 Created features like user registration, login, and profile updates.</a:t>
-            </a:r>
           </a:p>
           <a:p>
             <a:pPr marL="0" marR="0" lvl="0" indent="0" algn="l" defTabSz="914400" rtl="0" eaLnBrk="0" fontAlgn="base" latinLnBrk="0" hangingPunct="0">
@@ -17953,17 +17868,20 @@
               <a:buSzTx/>
               <a:tabLst/>
             </a:pPr>
-            <a:endParaRPr kumimoji="0" lang="en-US" altLang="en-US" sz="1800" b="0" i="0" u="none" strike="noStrike" cap="none" normalizeH="0" baseline="0">
-              <a:ln>
-                <a:noFill/>
-              </a:ln>
-              <a:solidFill>
-                <a:schemeClr val="tx1"/>
-              </a:solidFill>
-              <a:effectLst/>
-              <a:latin typeface="Times New Roman" panose="02020603050405020304" pitchFamily="18" charset="0"/>
-              <a:cs typeface="Times New Roman" panose="02020603050405020304" pitchFamily="18" charset="0"/>
-            </a:endParaRPr>
+            <a:r>
+              <a:rPr kumimoji="0" lang="en-US" altLang="en-US" sz="1800" b="0" i="0" u="none" strike="noStrike" cap="none" normalizeH="0" baseline="0" dirty="0">
+                <a:ln>
+                  <a:noFill/>
+                </a:ln>
+                <a:solidFill>
+                  <a:schemeClr val="tx1"/>
+                </a:solidFill>
+                <a:effectLst/>
+                <a:latin typeface="Times New Roman" panose="02020603050405020304" pitchFamily="18" charset="0"/>
+                <a:cs typeface="Times New Roman" panose="02020603050405020304" pitchFamily="18" charset="0"/>
+              </a:rPr>
+              <a:t>🧪 Tested all APIs with Postman to make sure they work well.</a:t>
+            </a:r>
           </a:p>
           <a:p>
             <a:pPr marL="0" marR="0" lvl="0" indent="0" algn="l" defTabSz="914400" rtl="0" eaLnBrk="0" fontAlgn="base" latinLnBrk="0" hangingPunct="0">
@@ -17978,12 +17896,94 @@
               </a:spcAft>
               <a:buClrTx/>
               <a:buSzTx/>
-              <a:buFontTx/>
-              <a:buChar char="•"/>
               <a:tabLst/>
             </a:pPr>
-            <a:r>
-              <a:rPr kumimoji="0" lang="en-US" altLang="en-US" sz="1800" b="0" i="0" u="none" strike="noStrike" cap="none" normalizeH="0" baseline="0">
+            <a:endParaRPr kumimoji="0" lang="en-US" altLang="en-US" sz="1800" b="0" i="0" u="none" strike="noStrike" cap="none" normalizeH="0" baseline="0" dirty="0">
+              <a:ln>
+                <a:noFill/>
+              </a:ln>
+              <a:solidFill>
+                <a:schemeClr val="tx1"/>
+              </a:solidFill>
+              <a:effectLst/>
+              <a:latin typeface="Times New Roman" panose="02020603050405020304" pitchFamily="18" charset="0"/>
+              <a:cs typeface="Times New Roman" panose="02020603050405020304" pitchFamily="18" charset="0"/>
+            </a:endParaRPr>
+          </a:p>
+          <a:p>
+            <a:pPr marL="0" marR="0" lvl="0" indent="0" algn="l" defTabSz="914400" rtl="0" eaLnBrk="0" fontAlgn="base" latinLnBrk="0" hangingPunct="0">
+              <a:lnSpc>
+                <a:spcPct val="100000"/>
+              </a:lnSpc>
+              <a:spcBef>
+                <a:spcPct val="0"/>
+              </a:spcBef>
+              <a:spcAft>
+                <a:spcPct val="0"/>
+              </a:spcAft>
+              <a:buClrTx/>
+              <a:buSzTx/>
+              <a:tabLst/>
+            </a:pPr>
+            <a:r>
+              <a:rPr kumimoji="0" lang="en-US" altLang="en-US" sz="1800" b="0" i="0" u="none" strike="noStrike" cap="none" normalizeH="0" baseline="0" dirty="0">
+                <a:ln>
+                  <a:noFill/>
+                </a:ln>
+                <a:solidFill>
+                  <a:schemeClr val="tx1"/>
+                </a:solidFill>
+                <a:effectLst/>
+                <a:latin typeface="Times New Roman" panose="02020603050405020304" pitchFamily="18" charset="0"/>
+                <a:cs typeface="Times New Roman" panose="02020603050405020304" pitchFamily="18" charset="0"/>
+              </a:rPr>
+              <a:t>👤 Created features like user registration, login, and profile updates.</a:t>
+            </a:r>
+          </a:p>
+          <a:p>
+            <a:pPr marL="0" marR="0" lvl="0" indent="0" algn="l" defTabSz="914400" rtl="0" eaLnBrk="0" fontAlgn="base" latinLnBrk="0" hangingPunct="0">
+              <a:lnSpc>
+                <a:spcPct val="100000"/>
+              </a:lnSpc>
+              <a:spcBef>
+                <a:spcPct val="0"/>
+              </a:spcBef>
+              <a:spcAft>
+                <a:spcPct val="0"/>
+              </a:spcAft>
+              <a:buClrTx/>
+              <a:buSzTx/>
+              <a:tabLst/>
+            </a:pPr>
+            <a:endParaRPr kumimoji="0" lang="en-US" altLang="en-US" sz="1800" b="0" i="0" u="none" strike="noStrike" cap="none" normalizeH="0" baseline="0" dirty="0">
+              <a:ln>
+                <a:noFill/>
+              </a:ln>
+              <a:solidFill>
+                <a:schemeClr val="tx1"/>
+              </a:solidFill>
+              <a:effectLst/>
+              <a:latin typeface="Times New Roman" panose="02020603050405020304" pitchFamily="18" charset="0"/>
+              <a:cs typeface="Times New Roman" panose="02020603050405020304" pitchFamily="18" charset="0"/>
+            </a:endParaRPr>
+          </a:p>
+          <a:p>
+            <a:pPr marL="0" marR="0" lvl="0" indent="0" algn="l" defTabSz="914400" rtl="0" eaLnBrk="0" fontAlgn="base" latinLnBrk="0" hangingPunct="0">
+              <a:lnSpc>
+                <a:spcPct val="100000"/>
+              </a:lnSpc>
+              <a:spcBef>
+                <a:spcPct val="0"/>
+              </a:spcBef>
+              <a:spcAft>
+                <a:spcPct val="0"/>
+              </a:spcAft>
+              <a:buClrTx/>
+              <a:buSzTx/>
+              <a:tabLst/>
+            </a:pPr>
+            <a:r>
+              <a:rPr kumimoji="0" lang="en-US" altLang="en-US" sz="1800" b="0" i="0" u="none" strike="noStrike" cap="none" normalizeH="0" baseline="0" dirty="0">
                 <a:ln>
                   <a:noFill/>
                 </a:ln>

</xml_diff>

<commit_message>
LLM fundamentals practice done
</commit_message>
<xml_diff>
--- a/Git_Projects/Smart_Parking_Finder_Poc/Smart_Parking_Presentation_Refined.pptx
+++ b/Git_Projects/Smart_Parking_Finder_Poc/Smart_Parking_Presentation_Refined.pptx
@@ -140,7 +140,7 @@
           <a:p>
             <a:fld id="{0345684D-F9C7-43E6-838A-F00553FF0D14}" type="datetimeFigureOut">
               <a:rPr lang="en-IN" smtClean="0"/>
-              <a:t>06-10-2025</a:t>
+              <a:t>06-11-2025</a:t>
             </a:fld>
             <a:endParaRPr lang="en-IN"/>
           </a:p>
@@ -953,7 +953,7 @@
           <a:p>
             <a:fld id="{1D8BD707-D9CF-40AE-B4C6-C98DA3205C09}" type="datetimeFigureOut">
               <a:rPr lang="en-US"/>
-              <a:t>10/6/2025</a:t>
+              <a:t>11/6/2025</a:t>
             </a:fld>
             <a:endParaRPr lang="en-US"/>
           </a:p>
@@ -1101,7 +1101,7 @@
           <a:p>
             <a:fld id="{1D8BD707-D9CF-40AE-B4C6-C98DA3205C09}" type="datetimeFigureOut">
               <a:rPr lang="en-US"/>
-              <a:t>10/6/2025</a:t>
+              <a:t>11/6/2025</a:t>
             </a:fld>
             <a:endParaRPr lang="en-US"/>
           </a:p>
@@ -1294,7 +1294,7 @@
           <a:p>
             <a:fld id="{8CFBE4D0-E68C-4FB2-8B3A-AA41DAF039F9}" type="datetimeFigureOut">
               <a:rPr lang="en-US" smtClean="0"/>
-              <a:t>10/6/2025</a:t>
+              <a:t>11/6/2025</a:t>
             </a:fld>
             <a:endParaRPr lang="en-US"/>
           </a:p>
@@ -1540,7 +1540,7 @@
           <a:p>
             <a:fld id="{1D8BD707-D9CF-40AE-B4C6-C98DA3205C09}" type="datetimeFigureOut">
               <a:rPr lang="en-US"/>
-              <a:t>10/6/2025</a:t>
+              <a:t>11/6/2025</a:t>
             </a:fld>
             <a:endParaRPr lang="en-US"/>
           </a:p>

</xml_diff>